<commit_message>
Otras aclaraciones en la interfaz1
</commit_message>
<xml_diff>
--- a/interfaz-vista/interfaz-1.pptx
+++ b/interfaz-vista/interfaz-1.pptx
@@ -110,6 +110,11 @@
       </a:defRPr>
     </a:lvl9pPr>
   </p:defaultTextStyle>
+  <p:extLst>
+    <p:ext uri="{EFAFB233-063F-42B5-8137-9DF3F51BA10A}">
+      <p15:sldGuideLst xmlns:p15="http://schemas.microsoft.com/office/powerpoint/2012/main"/>
+    </p:ext>
+  </p:extLst>
 </p:presentation>
 </file>
 
@@ -244,7 +249,7 @@
           <a:p>
             <a:fld id="{C36E7963-36BB-44B4-AE99-0D5A92407603}" type="datetimeFigureOut">
               <a:rPr lang="es-AR" smtClean="0"/>
-              <a:t>12/3/2024</a:t>
+              <a:t>13/3/2024</a:t>
             </a:fld>
             <a:endParaRPr lang="es-AR"/>
           </a:p>
@@ -414,7 +419,7 @@
           <a:p>
             <a:fld id="{C36E7963-36BB-44B4-AE99-0D5A92407603}" type="datetimeFigureOut">
               <a:rPr lang="es-AR" smtClean="0"/>
-              <a:t>12/3/2024</a:t>
+              <a:t>13/3/2024</a:t>
             </a:fld>
             <a:endParaRPr lang="es-AR"/>
           </a:p>
@@ -594,7 +599,7 @@
           <a:p>
             <a:fld id="{C36E7963-36BB-44B4-AE99-0D5A92407603}" type="datetimeFigureOut">
               <a:rPr lang="es-AR" smtClean="0"/>
-              <a:t>12/3/2024</a:t>
+              <a:t>13/3/2024</a:t>
             </a:fld>
             <a:endParaRPr lang="es-AR"/>
           </a:p>
@@ -764,7 +769,7 @@
           <a:p>
             <a:fld id="{C36E7963-36BB-44B4-AE99-0D5A92407603}" type="datetimeFigureOut">
               <a:rPr lang="es-AR" smtClean="0"/>
-              <a:t>12/3/2024</a:t>
+              <a:t>13/3/2024</a:t>
             </a:fld>
             <a:endParaRPr lang="es-AR"/>
           </a:p>
@@ -1010,7 +1015,7 @@
           <a:p>
             <a:fld id="{C36E7963-36BB-44B4-AE99-0D5A92407603}" type="datetimeFigureOut">
               <a:rPr lang="es-AR" smtClean="0"/>
-              <a:t>12/3/2024</a:t>
+              <a:t>13/3/2024</a:t>
             </a:fld>
             <a:endParaRPr lang="es-AR"/>
           </a:p>
@@ -1242,7 +1247,7 @@
           <a:p>
             <a:fld id="{C36E7963-36BB-44B4-AE99-0D5A92407603}" type="datetimeFigureOut">
               <a:rPr lang="es-AR" smtClean="0"/>
-              <a:t>12/3/2024</a:t>
+              <a:t>13/3/2024</a:t>
             </a:fld>
             <a:endParaRPr lang="es-AR"/>
           </a:p>
@@ -1609,7 +1614,7 @@
           <a:p>
             <a:fld id="{C36E7963-36BB-44B4-AE99-0D5A92407603}" type="datetimeFigureOut">
               <a:rPr lang="es-AR" smtClean="0"/>
-              <a:t>12/3/2024</a:t>
+              <a:t>13/3/2024</a:t>
             </a:fld>
             <a:endParaRPr lang="es-AR"/>
           </a:p>
@@ -1727,7 +1732,7 @@
           <a:p>
             <a:fld id="{C36E7963-36BB-44B4-AE99-0D5A92407603}" type="datetimeFigureOut">
               <a:rPr lang="es-AR" smtClean="0"/>
-              <a:t>12/3/2024</a:t>
+              <a:t>13/3/2024</a:t>
             </a:fld>
             <a:endParaRPr lang="es-AR"/>
           </a:p>
@@ -1822,7 +1827,7 @@
           <a:p>
             <a:fld id="{C36E7963-36BB-44B4-AE99-0D5A92407603}" type="datetimeFigureOut">
               <a:rPr lang="es-AR" smtClean="0"/>
-              <a:t>12/3/2024</a:t>
+              <a:t>13/3/2024</a:t>
             </a:fld>
             <a:endParaRPr lang="es-AR"/>
           </a:p>
@@ -2099,7 +2104,7 @@
           <a:p>
             <a:fld id="{C36E7963-36BB-44B4-AE99-0D5A92407603}" type="datetimeFigureOut">
               <a:rPr lang="es-AR" smtClean="0"/>
-              <a:t>12/3/2024</a:t>
+              <a:t>13/3/2024</a:t>
             </a:fld>
             <a:endParaRPr lang="es-AR"/>
           </a:p>
@@ -2352,7 +2357,7 @@
           <a:p>
             <a:fld id="{C36E7963-36BB-44B4-AE99-0D5A92407603}" type="datetimeFigureOut">
               <a:rPr lang="es-AR" smtClean="0"/>
-              <a:t>12/3/2024</a:t>
+              <a:t>13/3/2024</a:t>
             </a:fld>
             <a:endParaRPr lang="es-AR"/>
           </a:p>
@@ -2565,7 +2570,7 @@
           <a:p>
             <a:fld id="{C36E7963-36BB-44B4-AE99-0D5A92407603}" type="datetimeFigureOut">
               <a:rPr lang="es-AR" smtClean="0"/>
-              <a:t>12/3/2024</a:t>
+              <a:t>13/3/2024</a:t>
             </a:fld>
             <a:endParaRPr lang="es-AR"/>
           </a:p>
@@ -3504,11 +3509,7 @@
             <a:pPr algn="ctr"/>
             <a:r>
               <a:rPr lang="es-ES" dirty="0" smtClean="0"/>
-              <a:t>Mesa 2 </a:t>
-            </a:r>
-            <a:r>
-              <a:rPr lang="es-ES" dirty="0" smtClean="0"/>
-              <a:t>(disp.)</a:t>
+              <a:t>Mesa 2 (disp.)</a:t>
             </a:r>
             <a:endParaRPr lang="es-AR" dirty="0" smtClean="0"/>
           </a:p>
@@ -3552,11 +3553,7 @@
             <a:pPr algn="ctr"/>
             <a:r>
               <a:rPr lang="es-ES" dirty="0" smtClean="0"/>
-              <a:t>Mesa 3 </a:t>
-            </a:r>
-            <a:r>
-              <a:rPr lang="es-ES" dirty="0" smtClean="0"/>
-              <a:t>(disp.)</a:t>
+              <a:t>Mesa 3 (disp.)</a:t>
             </a:r>
             <a:endParaRPr lang="es-AR" dirty="0"/>
           </a:p>
@@ -3600,11 +3597,7 @@
             <a:pPr algn="ctr"/>
             <a:r>
               <a:rPr lang="es-ES" dirty="0" smtClean="0"/>
-              <a:t>Mesa 5 </a:t>
-            </a:r>
-            <a:r>
-              <a:rPr lang="es-ES" dirty="0" smtClean="0"/>
-              <a:t>(disp.)</a:t>
+              <a:t>Mesa 5 (disp.)</a:t>
             </a:r>
             <a:endParaRPr lang="es-AR" dirty="0"/>
           </a:p>
@@ -3648,11 +3641,7 @@
             <a:pPr algn="ctr"/>
             <a:r>
               <a:rPr lang="es-ES" dirty="0" smtClean="0"/>
-              <a:t>Mesa 6 </a:t>
-            </a:r>
-            <a:r>
-              <a:rPr lang="es-ES" dirty="0" smtClean="0"/>
-              <a:t>(</a:t>
+              <a:t>Mesa 6 (</a:t>
             </a:r>
             <a:r>
               <a:rPr lang="es-ES" dirty="0" err="1" smtClean="0"/>
@@ -3704,11 +3693,7 @@
             <a:pPr algn="ctr"/>
             <a:r>
               <a:rPr lang="es-ES" dirty="0" smtClean="0"/>
-              <a:t>Mesa 4 </a:t>
-            </a:r>
-            <a:r>
-              <a:rPr lang="es-ES" dirty="0" smtClean="0"/>
-              <a:t>(</a:t>
+              <a:t>Mesa 4 (</a:t>
             </a:r>
             <a:r>
               <a:rPr lang="es-ES" dirty="0" err="1" smtClean="0"/>
@@ -6586,6 +6571,69 @@
           </a:p>
         </p:txBody>
       </p:sp>
+      <p:sp>
+        <p:nvSpPr>
+          <p:cNvPr id="2" name="CuadroTexto 1"/>
+          <p:cNvSpPr txBox="1"/>
+          <p:nvPr/>
+        </p:nvSpPr>
+        <p:spPr>
+          <a:xfrm>
+            <a:off x="7297615" y="1934308"/>
+            <a:ext cx="3323491" cy="646331"/>
+          </a:xfrm>
+          <a:prstGeom prst="rect">
+            <a:avLst/>
+          </a:prstGeom>
+          <a:noFill/>
+        </p:spPr>
+        <p:txBody>
+          <a:bodyPr wrap="square" rtlCol="0">
+            <a:spAutoFit/>
+          </a:bodyPr>
+          <a:lstStyle/>
+          <a:p>
+            <a:r>
+              <a:rPr lang="es-ES" dirty="0" smtClean="0"/>
+              <a:t>Falta hacer la pantalla de eliminar o modificar platos</a:t>
+            </a:r>
+            <a:endParaRPr lang="es-AR" dirty="0"/>
+          </a:p>
+        </p:txBody>
+      </p:sp>
+      <p:cxnSp>
+        <p:nvCxnSpPr>
+          <p:cNvPr id="4" name="Conector recto de flecha 3"/>
+          <p:cNvCxnSpPr/>
+          <p:nvPr/>
+        </p:nvCxnSpPr>
+        <p:spPr>
+          <a:xfrm flipV="1">
+            <a:off x="5227027" y="2347546"/>
+            <a:ext cx="1798027" cy="1556239"/>
+          </a:xfrm>
+          <a:prstGeom prst="straightConnector1">
+            <a:avLst/>
+          </a:prstGeom>
+          <a:ln>
+            <a:tailEnd type="triangle"/>
+          </a:ln>
+        </p:spPr>
+        <p:style>
+          <a:lnRef idx="1">
+            <a:schemeClr val="accent1"/>
+          </a:lnRef>
+          <a:fillRef idx="0">
+            <a:schemeClr val="accent1"/>
+          </a:fillRef>
+          <a:effectRef idx="0">
+            <a:schemeClr val="accent1"/>
+          </a:effectRef>
+          <a:fontRef idx="minor">
+            <a:schemeClr val="tx1"/>
+          </a:fontRef>
+        </p:style>
+      </p:cxnSp>
     </p:spTree>
     <p:extLst>
       <p:ext uri="{BB962C8B-B14F-4D97-AF65-F5344CB8AC3E}">

</xml_diff>

<commit_message>
Cambios en el archivo de interfaces
</commit_message>
<xml_diff>
--- a/interfaz-vista/interfaz-1.pptx
+++ b/interfaz-vista/interfaz-1.pptx
@@ -3348,6 +3348,80 @@
           </a:p>
         </p:txBody>
       </p:sp>
+      <p:sp>
+        <p:nvSpPr>
+          <p:cNvPr id="3" name="CuadroTexto 2"/>
+          <p:cNvSpPr txBox="1"/>
+          <p:nvPr/>
+        </p:nvSpPr>
+        <p:spPr>
+          <a:xfrm>
+            <a:off x="334107" y="4088402"/>
+            <a:ext cx="3200400" cy="1200329"/>
+          </a:xfrm>
+          <a:prstGeom prst="rect">
+            <a:avLst/>
+          </a:prstGeom>
+          <a:noFill/>
+        </p:spPr>
+        <p:txBody>
+          <a:bodyPr wrap="square" rtlCol="0">
+            <a:spAutoFit/>
+          </a:bodyPr>
+          <a:lstStyle/>
+          <a:p>
+            <a:r>
+              <a:rPr lang="es-ES" dirty="0" smtClean="0"/>
+              <a:t>Ver si hacemos un perfil para el cajero, por si tenemos dos o más </a:t>
+            </a:r>
+            <a:r>
+              <a:rPr lang="es-ES" dirty="0" err="1" smtClean="0"/>
+              <a:t>compus</a:t>
+            </a:r>
+            <a:r>
+              <a:rPr lang="es-ES" dirty="0" smtClean="0"/>
+              <a:t>. El botón sería por ej ‘Cajero o Ingreso Cajero’.</a:t>
+            </a:r>
+            <a:endParaRPr lang="es-AR" dirty="0"/>
+          </a:p>
+        </p:txBody>
+      </p:sp>
+      <p:cxnSp>
+        <p:nvCxnSpPr>
+          <p:cNvPr id="6" name="Conector recto de flecha 5"/>
+          <p:cNvCxnSpPr>
+            <a:stCxn id="12" idx="1"/>
+            <a:endCxn id="3" idx="3"/>
+          </p:cNvCxnSpPr>
+          <p:nvPr/>
+        </p:nvCxnSpPr>
+        <p:spPr>
+          <a:xfrm flipH="1">
+            <a:off x="3534507" y="4681873"/>
+            <a:ext cx="1239709" cy="6694"/>
+          </a:xfrm>
+          <a:prstGeom prst="straightConnector1">
+            <a:avLst/>
+          </a:prstGeom>
+          <a:ln>
+            <a:tailEnd type="triangle"/>
+          </a:ln>
+        </p:spPr>
+        <p:style>
+          <a:lnRef idx="1">
+            <a:schemeClr val="accent1"/>
+          </a:lnRef>
+          <a:fillRef idx="0">
+            <a:schemeClr val="accent1"/>
+          </a:fillRef>
+          <a:effectRef idx="0">
+            <a:schemeClr val="accent1"/>
+          </a:effectRef>
+          <a:fontRef idx="minor">
+            <a:schemeClr val="tx1"/>
+          </a:fontRef>
+        </p:style>
+      </p:cxnSp>
     </p:spTree>
     <p:extLst>
       <p:ext uri="{BB962C8B-B14F-4D97-AF65-F5344CB8AC3E}">
@@ -4286,8 +4360,9 @@
             <a:pPr algn="ctr"/>
             <a:r>
               <a:rPr lang="es-ES" dirty="0" smtClean="0"/>
-              <a:t>Info de la mesa</a:t>
-            </a:r>
+              <a:t>Consultar Detalle de Mesa</a:t>
+            </a:r>
+            <a:endParaRPr lang="es-ES" dirty="0" smtClean="0"/>
           </a:p>
         </p:txBody>
       </p:sp>
@@ -4299,8 +4374,8 @@
         </p:nvSpPr>
         <p:spPr>
           <a:xfrm>
-            <a:off x="2787162" y="1691049"/>
-            <a:ext cx="3209192" cy="1477328"/>
+            <a:off x="624256" y="1712601"/>
+            <a:ext cx="2242036" cy="923330"/>
           </a:xfrm>
           <a:prstGeom prst="rect">
             <a:avLst/>
@@ -4315,33 +4390,33 @@
           <a:p>
             <a:r>
               <a:rPr lang="es-ES" dirty="0" smtClean="0"/>
-              <a:t>Nro de mesa:</a:t>
-            </a:r>
-          </a:p>
-          <a:p>
-            <a:r>
-              <a:rPr lang="es-ES" dirty="0" smtClean="0"/>
-              <a:t>Mozo: __</a:t>
-            </a:r>
-          </a:p>
-          <a:p>
-            <a:r>
-              <a:rPr lang="es-ES" dirty="0" smtClean="0"/>
-              <a:t>Fecha: __</a:t>
-            </a:r>
-          </a:p>
-          <a:p>
-            <a:r>
-              <a:rPr lang="es-ES" dirty="0" smtClean="0"/>
-              <a:t>Hora: __</a:t>
-            </a:r>
-          </a:p>
-          <a:p>
-            <a:r>
-              <a:rPr lang="es-ES" dirty="0" smtClean="0"/>
-              <a:t>+ datos</a:t>
-            </a:r>
-            <a:endParaRPr lang="es-AR" dirty="0"/>
+              <a:t>Datos de Mesa</a:t>
+            </a:r>
+          </a:p>
+          <a:p>
+            <a:r>
+              <a:rPr lang="es-ES" dirty="0" smtClean="0"/>
+              <a:t>Nro. </a:t>
+            </a:r>
+            <a:r>
+              <a:rPr lang="es-ES" dirty="0" smtClean="0"/>
+              <a:t>de mesa</a:t>
+            </a:r>
+            <a:r>
+              <a:rPr lang="es-ES" dirty="0" smtClean="0"/>
+              <a:t>: __</a:t>
+            </a:r>
+            <a:endParaRPr lang="es-ES" dirty="0" smtClean="0"/>
+          </a:p>
+          <a:p>
+            <a:r>
+              <a:rPr lang="es-ES" dirty="0" smtClean="0"/>
+              <a:t>Mozo: </a:t>
+            </a:r>
+            <a:r>
+              <a:rPr lang="es-ES" dirty="0" smtClean="0"/>
+              <a:t>__</a:t>
+            </a:r>
           </a:p>
         </p:txBody>
       </p:sp>
@@ -4353,7 +4428,7 @@
         </p:nvSpPr>
         <p:spPr>
           <a:xfrm>
-            <a:off x="2329964" y="4996956"/>
+            <a:off x="2017835" y="4992558"/>
             <a:ext cx="2233246" cy="430823"/>
           </a:xfrm>
           <a:prstGeom prst="rect">
@@ -4389,14 +4464,14 @@
       </p:sp>
       <p:sp>
         <p:nvSpPr>
-          <p:cNvPr id="7" name="CuadroTexto 6"/>
+          <p:cNvPr id="5" name="CuadroTexto 4"/>
           <p:cNvSpPr txBox="1"/>
           <p:nvPr/>
         </p:nvSpPr>
         <p:spPr>
           <a:xfrm>
-            <a:off x="5908431" y="1691049"/>
-            <a:ext cx="3209192" cy="369332"/>
+            <a:off x="3361592" y="1647609"/>
+            <a:ext cx="3094892" cy="2862322"/>
           </a:xfrm>
           <a:prstGeom prst="rect">
             <a:avLst/>
@@ -4413,48 +4488,70 @@
               <a:rPr lang="es-ES" dirty="0" smtClean="0"/>
               <a:t>Detalle de Pedido</a:t>
             </a:r>
+          </a:p>
+          <a:p>
+            <a:endParaRPr lang="es-ES" dirty="0" smtClean="0"/>
+          </a:p>
+          <a:p>
+            <a:r>
+              <a:rPr lang="es-ES" dirty="0" smtClean="0"/>
+              <a:t>- </a:t>
+            </a:r>
+            <a:r>
+              <a:rPr lang="es-ES" dirty="0" smtClean="0"/>
+              <a:t>Pedido Nro 00</a:t>
+            </a:r>
+          </a:p>
+          <a:p>
+            <a:r>
+              <a:rPr lang="es-ES" dirty="0" smtClean="0"/>
+              <a:t>Producto 1 $__</a:t>
+            </a:r>
+          </a:p>
+          <a:p>
+            <a:r>
+              <a:rPr lang="es-ES" dirty="0" smtClean="0"/>
+              <a:t>Producto 2 </a:t>
+            </a:r>
+            <a:r>
+              <a:rPr lang="es-ES" dirty="0" smtClean="0"/>
+              <a:t>$__</a:t>
+            </a:r>
+          </a:p>
+          <a:p>
+            <a:endParaRPr lang="es-ES" dirty="0"/>
+          </a:p>
+          <a:p>
+            <a:r>
+              <a:rPr lang="es-ES" dirty="0"/>
+              <a:t>Fecha</a:t>
+            </a:r>
+            <a:r>
+              <a:rPr lang="es-ES" dirty="0" smtClean="0"/>
+              <a:t>: __/__/__</a:t>
+            </a:r>
+            <a:endParaRPr lang="es-ES" dirty="0"/>
+          </a:p>
+          <a:p>
+            <a:r>
+              <a:rPr lang="es-ES" dirty="0"/>
+              <a:t>Hora</a:t>
+            </a:r>
+            <a:r>
+              <a:rPr lang="es-ES" dirty="0" smtClean="0"/>
+              <a:t>: __:__ hs</a:t>
+            </a:r>
+            <a:endParaRPr lang="es-ES" dirty="0"/>
+          </a:p>
+          <a:p>
+            <a:r>
+              <a:rPr lang="es-ES" dirty="0"/>
+              <a:t>Importe Total: $____</a:t>
+            </a:r>
             <a:endParaRPr lang="es-AR" dirty="0"/>
           </a:p>
-        </p:txBody>
-      </p:sp>
-      <p:sp>
-        <p:nvSpPr>
-          <p:cNvPr id="5" name="CuadroTexto 4"/>
-          <p:cNvSpPr txBox="1"/>
-          <p:nvPr/>
-        </p:nvSpPr>
-        <p:spPr>
-          <a:xfrm>
-            <a:off x="6400801" y="2267137"/>
-            <a:ext cx="3094892" cy="923330"/>
-          </a:xfrm>
-          <a:prstGeom prst="rect">
-            <a:avLst/>
-          </a:prstGeom>
-          <a:noFill/>
-        </p:spPr>
-        <p:txBody>
-          <a:bodyPr wrap="square" rtlCol="0">
-            <a:spAutoFit/>
-          </a:bodyPr>
-          <a:lstStyle/>
-          <a:p>
-            <a:r>
-              <a:rPr lang="es-ES" dirty="0" smtClean="0"/>
-              <a:t>- Pedido Nro 00</a:t>
-            </a:r>
-          </a:p>
-          <a:p>
-            <a:r>
-              <a:rPr lang="es-ES" dirty="0" smtClean="0"/>
-              <a:t>Producto 1 $__</a:t>
-            </a:r>
-          </a:p>
-          <a:p>
-            <a:r>
-              <a:rPr lang="es-ES" dirty="0" smtClean="0"/>
-              <a:t>Producto 2 $__</a:t>
-            </a:r>
+          <a:p>
+            <a:endParaRPr lang="es-ES" dirty="0" smtClean="0"/>
           </a:p>
         </p:txBody>
       </p:sp>
@@ -4466,7 +4563,7 @@
         </p:nvSpPr>
         <p:spPr>
           <a:xfrm>
-            <a:off x="4835771" y="4996956"/>
+            <a:off x="8301403" y="4335480"/>
             <a:ext cx="2233246" cy="430823"/>
           </a:xfrm>
           <a:prstGeom prst="rect">
@@ -4494,37 +4591,11 @@
             <a:pPr algn="ctr"/>
             <a:r>
               <a:rPr lang="es-ES" dirty="0" smtClean="0"/>
-              <a:t>Emitir Ticket</a:t>
-            </a:r>
-            <a:endParaRPr lang="es-AR" dirty="0"/>
-          </a:p>
-        </p:txBody>
-      </p:sp>
-      <p:sp>
-        <p:nvSpPr>
-          <p:cNvPr id="8" name="CuadroTexto 7"/>
-          <p:cNvSpPr txBox="1"/>
-          <p:nvPr/>
-        </p:nvSpPr>
-        <p:spPr>
-          <a:xfrm>
-            <a:off x="6400800" y="3344002"/>
-            <a:ext cx="2690446" cy="369332"/>
-          </a:xfrm>
-          <a:prstGeom prst="rect">
-            <a:avLst/>
-          </a:prstGeom>
-          <a:noFill/>
-        </p:spPr>
-        <p:txBody>
-          <a:bodyPr wrap="square" rtlCol="0">
-            <a:spAutoFit/>
-          </a:bodyPr>
-          <a:lstStyle/>
-          <a:p>
-            <a:r>
-              <a:rPr lang="es-ES" dirty="0" smtClean="0"/>
-              <a:t>Importe Total: $____</a:t>
+              <a:t>Imprimir </a:t>
+            </a:r>
+            <a:r>
+              <a:rPr lang="es-ES" dirty="0" smtClean="0"/>
+              <a:t>Ticket</a:t>
             </a:r>
             <a:endParaRPr lang="es-AR" dirty="0"/>
           </a:p>
@@ -4538,7 +4609,7 @@
         </p:nvSpPr>
         <p:spPr>
           <a:xfrm>
-            <a:off x="7341578" y="4996955"/>
+            <a:off x="8292611" y="4992558"/>
             <a:ext cx="2233246" cy="430823"/>
           </a:xfrm>
           <a:prstGeom prst="rect">
@@ -4646,16 +4717,95 @@
           </a:fontRef>
         </p:style>
       </p:cxnSp>
-      <p:sp>
-        <p:nvSpPr>
-          <p:cNvPr id="18" name="Rectángulo 17"/>
+      <p:cxnSp>
+        <p:nvCxnSpPr>
+          <p:cNvPr id="10" name="Conector recto 9"/>
+          <p:cNvCxnSpPr/>
+          <p:nvPr/>
+        </p:nvCxnSpPr>
+        <p:spPr>
+          <a:xfrm flipH="1">
+            <a:off x="6251331" y="949569"/>
+            <a:ext cx="17584" cy="5908431"/>
+          </a:xfrm>
+          <a:prstGeom prst="line">
+            <a:avLst/>
+          </a:prstGeom>
+        </p:spPr>
+        <p:style>
+          <a:lnRef idx="1">
+            <a:schemeClr val="accent1"/>
+          </a:lnRef>
+          <a:fillRef idx="0">
+            <a:schemeClr val="accent1"/>
+          </a:fillRef>
+          <a:effectRef idx="0">
+            <a:schemeClr val="accent1"/>
+          </a:effectRef>
+          <a:fontRef idx="minor">
+            <a:schemeClr val="tx1"/>
+          </a:fontRef>
+        </p:style>
+      </p:cxnSp>
+      <p:sp>
+        <p:nvSpPr>
+          <p:cNvPr id="21" name="CuadroTexto 20"/>
+          <p:cNvSpPr txBox="1"/>
+          <p:nvPr/>
+        </p:nvSpPr>
+        <p:spPr>
+          <a:xfrm>
+            <a:off x="6912219" y="1310050"/>
+            <a:ext cx="4799135" cy="1477328"/>
+          </a:xfrm>
+          <a:prstGeom prst="rect">
+            <a:avLst/>
+          </a:prstGeom>
+          <a:noFill/>
+        </p:spPr>
+        <p:txBody>
+          <a:bodyPr wrap="square" rtlCol="0">
+            <a:spAutoFit/>
+          </a:bodyPr>
+          <a:lstStyle/>
+          <a:p>
+            <a:pPr algn="ctr"/>
+            <a:r>
+              <a:rPr lang="es-ES" dirty="0" smtClean="0"/>
+              <a:t>Detalle de Pago</a:t>
+            </a:r>
+          </a:p>
+          <a:p>
+            <a:endParaRPr lang="es-ES" dirty="0"/>
+          </a:p>
+          <a:p>
+            <a:r>
+              <a:rPr lang="es-ES" dirty="0" smtClean="0"/>
+              <a:t>Monto total: $___,__</a:t>
+            </a:r>
+          </a:p>
+          <a:p>
+            <a:endParaRPr lang="es-ES" dirty="0" smtClean="0"/>
+          </a:p>
+          <a:p>
+            <a:r>
+              <a:rPr lang="es-ES" dirty="0" smtClean="0"/>
+              <a:t>Formas de pago: [ ] Efectivo  [ ] Tarjeta  [ ] Otro</a:t>
+            </a:r>
+            <a:endParaRPr lang="es-ES" dirty="0" smtClean="0"/>
+          </a:p>
+        </p:txBody>
+      </p:sp>
+      <p:sp>
+        <p:nvSpPr>
+          <p:cNvPr id="22" name="Rectángulo 21"/>
           <p:cNvSpPr/>
           <p:nvPr/>
         </p:nvSpPr>
         <p:spPr>
           <a:xfrm>
-            <a:off x="6185389" y="4043265"/>
-            <a:ext cx="2655275" cy="430823"/>
+            <a:off x="8295542" y="3256586"/>
+            <a:ext cx="2233246" cy="430823"/>
           </a:xfrm>
           <a:prstGeom prst="rect">
             <a:avLst/>
@@ -4679,53 +4829,12 @@
           <a:bodyPr rtlCol="0" anchor="ctr"/>
           <a:lstStyle/>
           <a:p>
-            <a:r>
-              <a:rPr lang="es-ES" dirty="0" smtClean="0"/>
-              <a:t>Forma de pago</a:t>
+            <a:pPr algn="ctr"/>
+            <a:r>
+              <a:rPr lang="es-ES" dirty="0" smtClean="0"/>
+              <a:t>Confirmar Pago</a:t>
             </a:r>
             <a:endParaRPr lang="es-AR" dirty="0"/>
-          </a:p>
-        </p:txBody>
-      </p:sp>
-      <p:sp>
-        <p:nvSpPr>
-          <p:cNvPr id="19" name="Triángulo isósceles 18"/>
-          <p:cNvSpPr/>
-          <p:nvPr/>
-        </p:nvSpPr>
-        <p:spPr>
-          <a:xfrm rot="10800000">
-            <a:off x="8354963" y="4173427"/>
-            <a:ext cx="386865" cy="199301"/>
-          </a:xfrm>
-          <a:prstGeom prst="triangle">
-            <a:avLst>
-              <a:gd name="adj" fmla="val 47849"/>
-            </a:avLst>
-          </a:prstGeom>
-        </p:spPr>
-        <p:style>
-          <a:lnRef idx="2">
-            <a:schemeClr val="accent3">
-              <a:shade val="50000"/>
-            </a:schemeClr>
-          </a:lnRef>
-          <a:fillRef idx="1">
-            <a:schemeClr val="accent3"/>
-          </a:fillRef>
-          <a:effectRef idx="0">
-            <a:schemeClr val="accent3"/>
-          </a:effectRef>
-          <a:fontRef idx="minor">
-            <a:schemeClr val="lt1"/>
-          </a:fontRef>
-        </p:style>
-        <p:txBody>
-          <a:bodyPr rtlCol="0" anchor="ctr"/>
-          <a:lstStyle/>
-          <a:p>
-            <a:pPr algn="ctr"/>
-            <a:endParaRPr lang="es-AR"/>
           </a:p>
         </p:txBody>
       </p:sp>

</xml_diff>